<commit_message>
Add comments and minor fixes
</commit_message>
<xml_diff>
--- a/Courses/Software-Sciences/IT-Module-4-Problem-Solving-with-ICT/09-Computer-Systems-Management/09-Computer-Systems-Management.pptx
+++ b/Courses/Software-Sciences/IT-Module-4-Problem-Solving-with-ICT/09-Computer-Systems-Management/09-Computer-Systems-Management.pptx
@@ -5,10 +5,10 @@
     <p:sldMasterId id="2147483675" r:id="rId1"/>
   </p:sldMasterIdLst>
   <p:notesMasterIdLst>
-    <p:notesMasterId r:id="rId39"/>
+    <p:notesMasterId r:id="rId40"/>
   </p:notesMasterIdLst>
   <p:handoutMasterIdLst>
-    <p:handoutMasterId r:id="rId40"/>
+    <p:handoutMasterId r:id="rId41"/>
   </p:handoutMasterIdLst>
   <p:sldIdLst>
     <p:sldId id="503" r:id="rId2"/>
@@ -31,23 +31,24 @@
     <p:sldId id="719" r:id="rId19"/>
     <p:sldId id="724" r:id="rId20"/>
     <p:sldId id="725" r:id="rId21"/>
-    <p:sldId id="726" r:id="rId22"/>
-    <p:sldId id="639" r:id="rId23"/>
-    <p:sldId id="684" r:id="rId24"/>
-    <p:sldId id="721" r:id="rId25"/>
-    <p:sldId id="722" r:id="rId26"/>
-    <p:sldId id="723" r:id="rId27"/>
-    <p:sldId id="610" r:id="rId28"/>
-    <p:sldId id="663" r:id="rId29"/>
-    <p:sldId id="700" r:id="rId30"/>
-    <p:sldId id="701" r:id="rId31"/>
-    <p:sldId id="702" r:id="rId32"/>
-    <p:sldId id="680" r:id="rId33"/>
-    <p:sldId id="687" r:id="rId34"/>
-    <p:sldId id="727" r:id="rId35"/>
-    <p:sldId id="633" r:id="rId36"/>
-    <p:sldId id="504" r:id="rId37"/>
-    <p:sldId id="505" r:id="rId38"/>
+    <p:sldId id="728" r:id="rId22"/>
+    <p:sldId id="726" r:id="rId23"/>
+    <p:sldId id="639" r:id="rId24"/>
+    <p:sldId id="684" r:id="rId25"/>
+    <p:sldId id="721" r:id="rId26"/>
+    <p:sldId id="722" r:id="rId27"/>
+    <p:sldId id="723" r:id="rId28"/>
+    <p:sldId id="610" r:id="rId29"/>
+    <p:sldId id="663" r:id="rId30"/>
+    <p:sldId id="700" r:id="rId31"/>
+    <p:sldId id="701" r:id="rId32"/>
+    <p:sldId id="702" r:id="rId33"/>
+    <p:sldId id="680" r:id="rId34"/>
+    <p:sldId id="687" r:id="rId35"/>
+    <p:sldId id="727" r:id="rId36"/>
+    <p:sldId id="633" r:id="rId37"/>
+    <p:sldId id="504" r:id="rId38"/>
+    <p:sldId id="505" r:id="rId39"/>
   </p:sldIdLst>
   <p:sldSz cx="12192000" cy="6858000"/>
   <p:notesSz cx="6858000" cy="9144000"/>
@@ -183,6 +184,7 @@
           <p14:sldIdLst>
             <p14:sldId id="724"/>
             <p14:sldId id="725"/>
+            <p14:sldId id="728"/>
             <p14:sldId id="726"/>
           </p14:sldIdLst>
         </p14:section>
@@ -266,6 +268,53 @@
 </p:cmAuthorLst>
 </file>
 
+<file path=ppt/comments/modernComment_2BE_175141EF.xml><?xml version="1.0" encoding="utf-8"?>
+<p188:cmLst xmlns:a="http://schemas.openxmlformats.org/drawingml/2006/main" xmlns:r="http://schemas.openxmlformats.org/officeDocument/2006/relationships" xmlns:p188="http://schemas.microsoft.com/office/powerpoint/2018/8/main">
+  <p188:cm id="{9D6FA34C-EF92-4749-BB18-D7618A3AEEEF}" authorId="{CB4BF2F8-D32F-9387-A6CE-368ED6EFDCF0}" created="2025-05-30T09:05:33.230">
+    <pc:sldMkLst xmlns:pc="http://schemas.microsoft.com/office/powerpoint/2013/main/command">
+      <pc:docMk/>
+      <pc:sldMk cId="391201263" sldId="702"/>
+    </pc:sldMkLst>
+    <p188:txBody>
+      <a:bodyPr/>
+      <a:lstStyle/>
+      <a:p>
+        <a:r>
+          <a:rPr lang="en-GB"/>
+          <a:t>Добавяне на снимка за всеки метод за архивиране на данни</a:t>
+        </a:r>
+      </a:p>
+    </p188:txBody>
+  </p188:cm>
+</p188:cmLst>
+</file>
+
+<file path=ppt/comments/modernComment_2CE_1F41E145.xml><?xml version="1.0" encoding="utf-8"?>
+<p188:cmLst xmlns:a="http://schemas.openxmlformats.org/drawingml/2006/main" xmlns:r="http://schemas.openxmlformats.org/officeDocument/2006/relationships" xmlns:p188="http://schemas.microsoft.com/office/powerpoint/2018/8/main">
+  <p188:cm id="{A8A10952-B6BF-47C2-98ED-532969C79F37}" authorId="{CB4BF2F8-D32F-9387-A6CE-368ED6EFDCF0}" created="2025-05-30T08:54:59.405">
+    <ac:txMkLst xmlns:ac="http://schemas.microsoft.com/office/drawing/2013/main/command">
+      <pc:docMk xmlns:pc="http://schemas.microsoft.com/office/powerpoint/2013/main/command"/>
+      <pc:sldMk xmlns:pc="http://schemas.microsoft.com/office/powerpoint/2013/main/command" cId="524411205" sldId="718"/>
+      <ac:spMk id="7" creationId="{E3256B1E-7246-A208-4C02-7D9555BD9137}"/>
+      <ac:txMk cp="0" len="57">
+        <ac:context len="58" hash="1098837108"/>
+      </ac:txMk>
+    </ac:txMkLst>
+    <p188:pos x="6629366" y="367156"/>
+    <p188:txBody>
+      <a:bodyPr/>
+      <a:lstStyle/>
+      <a:p>
+        <a:r>
+          <a:rPr lang="en-GB"/>
+          <a:t>Добавяне на описание на всички команди</a:t>
+        </a:r>
+      </a:p>
+    </p188:txBody>
+  </p188:cm>
+</p188:cmLst>
+</file>
+
 <file path=ppt/handoutMasters/handoutMaster1.xml><?xml version="1.0" encoding="utf-8"?>
 <p:handoutMaster xmlns:a="http://schemas.openxmlformats.org/drawingml/2006/main" xmlns:r="http://schemas.openxmlformats.org/officeDocument/2006/relationships" xmlns:p="http://schemas.openxmlformats.org/presentationml/2006/main">
   <p:cSld>
@@ -360,7 +409,7 @@
           <a:p>
             <a:fld id="{4E087215-0C8F-4762-A664-737A353EC9A4}" type="datetimeFigureOut">
               <a:rPr lang="bg-BG" smtClean="0"/>
-              <a:t>7.05.25 г.</a:t>
+              <a:t>30.5.2025 г.</a:t>
             </a:fld>
             <a:endParaRPr lang="bg-BG"/>
           </a:p>
@@ -556,7 +605,7 @@
           <a:p>
             <a:fld id="{72D84649-876A-46C9-8472-14CB09C070D8}" type="datetimeFigureOut">
               <a:rPr lang="en-US" smtClean="0"/>
-              <a:t>5/7/25</a:t>
+              <a:t>5/30/2025</a:t>
             </a:fld>
             <a:endParaRPr lang="en-US"/>
           </a:p>
@@ -1156,7 +1205,7 @@
             <a:fld id="{3EBA5BD7-F043-4D1B-AA17-CD412FC534DE}" type="slidenum">
               <a:rPr lang="en-US" smtClean="0"/>
               <a:pPr/>
-              <a:t>37</a:t>
+              <a:t>38</a:t>
             </a:fld>
             <a:endParaRPr lang="en-US" dirty="0"/>
           </a:p>
@@ -1730,7 +1779,7 @@
           <a:bodyPr/>
           <a:lstStyle/>
           <a:p>
-            <a:endParaRPr lang="en-US"/>
+            <a:endParaRPr lang="en-US" dirty="0"/>
           </a:p>
         </p:txBody>
       </p:sp>
@@ -2088,7 +2137,7 @@
             <a:fld id="{3EBA5BD7-F043-4D1B-AA17-CD412FC534DE}" type="slidenum">
               <a:rPr lang="en-US" smtClean="0"/>
               <a:pPr/>
-              <a:t>22</a:t>
+              <a:t>23</a:t>
             </a:fld>
             <a:endParaRPr lang="en-US" dirty="0"/>
           </a:p>
@@ -2318,7 +2367,7 @@
             <a:fld id="{3EBA5BD7-F043-4D1B-AA17-CD412FC534DE}" type="slidenum">
               <a:rPr lang="en-US" smtClean="0"/>
               <a:pPr/>
-              <a:t>27</a:t>
+              <a:t>28</a:t>
             </a:fld>
             <a:endParaRPr lang="en-US" dirty="0"/>
           </a:p>
@@ -2548,7 +2597,7 @@
             <a:fld id="{3EBA5BD7-F043-4D1B-AA17-CD412FC534DE}" type="slidenum">
               <a:rPr lang="en-US" smtClean="0"/>
               <a:pPr/>
-              <a:t>32</a:t>
+              <a:t>33</a:t>
             </a:fld>
             <a:endParaRPr lang="en-US" dirty="0"/>
           </a:p>
@@ -2778,7 +2827,7 @@
             <a:fld id="{3EBA5BD7-F043-4D1B-AA17-CD412FC534DE}" type="slidenum">
               <a:rPr lang="en-US" smtClean="0"/>
               <a:pPr/>
-              <a:t>35</a:t>
+              <a:t>36</a:t>
             </a:fld>
             <a:endParaRPr lang="en-US" dirty="0"/>
           </a:p>
@@ -3024,7 +3073,7 @@
             <a:fld id="{3EBA5BD7-F043-4D1B-AA17-CD412FC534DE}" type="slidenum">
               <a:rPr lang="en-US" smtClean="0"/>
               <a:pPr/>
-              <a:t>36</a:t>
+              <a:t>37</a:t>
             </a:fld>
             <a:endParaRPr lang="en-US" dirty="0"/>
           </a:p>
@@ -9987,7 +10036,7 @@
             </a:r>
             <a:r>
               <a:rPr lang="bg-BG" dirty="0"/>
-              <a:t>напр. онлайн, сисадмин</a:t>
+              <a:t>напр. онлайн, системен админ</a:t>
             </a:r>
             <a:r>
               <a:rPr lang="en-US" dirty="0"/>
@@ -10458,7 +10507,11 @@
             <a:avLst/>
           </a:prstGeom>
           <a:ln>
-            <a:noFill/>
+            <a:solidFill>
+              <a:schemeClr val="bg2">
+                <a:lumMod val="75000"/>
+              </a:schemeClr>
+            </a:solidFill>
           </a:ln>
         </p:spPr>
       </p:pic>
@@ -12161,8 +12214,8 @@
         </p:nvSpPr>
         <p:spPr bwMode="auto">
           <a:xfrm>
-            <a:off x="3306000" y="4591810"/>
-            <a:ext cx="4647034" cy="510609"/>
+            <a:off x="3306000" y="4697995"/>
+            <a:ext cx="4680000" cy="510609"/>
           </a:xfrm>
           <a:prstGeom prst="wedgeRoundRectCallout">
             <a:avLst>
@@ -12275,7 +12328,7 @@
         <p:spPr bwMode="auto">
           <a:xfrm>
             <a:off x="1191000" y="5811737"/>
-            <a:ext cx="4647034" cy="510609"/>
+            <a:ext cx="4185000" cy="510609"/>
           </a:xfrm>
           <a:prstGeom prst="wedgeRoundRectCallout">
             <a:avLst>
@@ -12669,6 +12722,11 @@
       <p:bldP spid="9" grpId="0" animBg="1"/>
     </p:bldLst>
   </p:timing>
+  <p:extLst>
+    <p:ext uri="{6950BFC3-D8DA-4A85-94F7-54DA5524770B}">
+      <p188:commentRel xmlns:p188="http://schemas.microsoft.com/office/powerpoint/2018/8/main" r:id="rId2"/>
+    </p:ext>
+  </p:extLst>
 </p:sld>
 </file>
 
@@ -14329,8 +14387,17 @@
             </a:r>
             <a:r>
               <a:rPr lang="bg-BG" sz="3200" b="1" dirty="0"/>
-              <a:t>текстов редактор по избор</a:t>
-            </a:r>
+              <a:t>текстов редактор по избор </a:t>
+            </a:r>
+            <a:r>
+              <a:rPr lang="bg-BG" sz="3200" dirty="0"/>
+              <a:t>(напр. </a:t>
+            </a:r>
+            <a:r>
+              <a:rPr lang="en-GB" sz="3200" dirty="0"/>
+              <a:t>Notepad)</a:t>
+            </a:r>
+            <a:endParaRPr lang="bg-BG" sz="3200" b="1" dirty="0"/>
           </a:p>
           <a:p>
             <a:pPr>
@@ -15174,6 +15241,142 @@
           <p:cNvPr id="2" name="Slide Number Placeholder 1">
             <a:extLst>
               <a:ext uri="{FF2B5EF4-FFF2-40B4-BE49-F238E27FC236}">
+                <a16:creationId xmlns:a16="http://schemas.microsoft.com/office/drawing/2014/main" id="{43FD7699-FA7B-BAE6-872A-60B6B56E4E43}"/>
+              </a:ext>
+            </a:extLst>
+          </p:cNvPr>
+          <p:cNvSpPr>
+            <a:spLocks noGrp="1"/>
+          </p:cNvSpPr>
+          <p:nvPr>
+            <p:ph type="sldNum" sz="quarter" idx="5"/>
+          </p:nvPr>
+        </p:nvSpPr>
+        <p:spPr/>
+        <p:txBody>
+          <a:bodyPr/>
+          <a:lstStyle/>
+          <a:p>
+            <a:fld id="{2BF067CD-8E6B-4360-9AA8-C5DF2A48A6D1}" type="slidenum">
+              <a:rPr lang="en-US" noProof="0" smtClean="0"/>
+              <a:pPr/>
+              <a:t>21</a:t>
+            </a:fld>
+            <a:endParaRPr lang="en-US" noProof="0"/>
+          </a:p>
+        </p:txBody>
+      </p:sp>
+      <p:sp>
+        <p:nvSpPr>
+          <p:cNvPr id="7" name="Text Placeholder 6">
+            <a:extLst>
+              <a:ext uri="{FF2B5EF4-FFF2-40B4-BE49-F238E27FC236}">
+                <a16:creationId xmlns:a16="http://schemas.microsoft.com/office/drawing/2014/main" id="{A6FD7495-43C0-0310-0D83-D69A0820B107}"/>
+              </a:ext>
+            </a:extLst>
+          </p:cNvPr>
+          <p:cNvSpPr>
+            <a:spLocks noGrp="1"/>
+          </p:cNvSpPr>
+          <p:nvPr>
+            <p:ph type="body" sz="quarter" idx="10"/>
+          </p:nvPr>
+        </p:nvSpPr>
+        <p:spPr/>
+        <p:txBody>
+          <a:bodyPr>
+            <a:normAutofit/>
+          </a:bodyPr>
+          <a:lstStyle/>
+          <a:p>
+            <a:r>
+              <a:rPr lang="bg-BG" sz="6000" dirty="0">
+                <a:highlight>
+                  <a:srgbClr val="FFFF00"/>
+                </a:highlight>
+              </a:rPr>
+              <a:t>Скрийншоти на стъпките при запазването + описание</a:t>
+            </a:r>
+            <a:endParaRPr lang="en-GB" sz="6000" dirty="0">
+              <a:highlight>
+                <a:srgbClr val="FFFF00"/>
+              </a:highlight>
+            </a:endParaRPr>
+          </a:p>
+        </p:txBody>
+      </p:sp>
+      <p:sp>
+        <p:nvSpPr>
+          <p:cNvPr id="6" name="Title 5">
+            <a:extLst>
+              <a:ext uri="{FF2B5EF4-FFF2-40B4-BE49-F238E27FC236}">
+                <a16:creationId xmlns:a16="http://schemas.microsoft.com/office/drawing/2014/main" id="{D0BACB9D-3CD7-4FD8-EF39-54708000A6CE}"/>
+              </a:ext>
+            </a:extLst>
+          </p:cNvPr>
+          <p:cNvSpPr>
+            <a:spLocks noGrp="1"/>
+          </p:cNvSpPr>
+          <p:nvPr>
+            <p:ph type="title"/>
+          </p:nvPr>
+        </p:nvSpPr>
+        <p:spPr/>
+        <p:txBody>
+          <a:bodyPr/>
+          <a:lstStyle/>
+          <a:p>
+            <a:r>
+              <a:rPr lang="bg-BG" dirty="0"/>
+              <a:t>Запазване на скрипта</a:t>
+            </a:r>
+            <a:endParaRPr lang="en-GB" dirty="0"/>
+          </a:p>
+        </p:txBody>
+      </p:sp>
+    </p:spTree>
+    <p:extLst>
+      <p:ext uri="{BB962C8B-B14F-4D97-AF65-F5344CB8AC3E}">
+        <p14:creationId xmlns:p14="http://schemas.microsoft.com/office/powerpoint/2010/main" val="1647042340"/>
+      </p:ext>
+    </p:extLst>
+  </p:cSld>
+  <p:clrMapOvr>
+    <a:masterClrMapping/>
+  </p:clrMapOvr>
+  <mc:AlternateContent xmlns:mc="http://schemas.openxmlformats.org/markup-compatibility/2006" xmlns:p14="http://schemas.microsoft.com/office/powerpoint/2010/main">
+    <mc:Choice Requires="p14">
+      <p:transition spd="slow" p14:dur="2000" advClick="0" advTm="5000"/>
+    </mc:Choice>
+    <mc:Fallback xmlns="">
+      <p:transition spd="slow" advClick="0" advTm="5000"/>
+    </mc:Fallback>
+  </mc:AlternateContent>
+</p:sld>
+</file>
+
+<file path=ppt/slides/slide22.xml><?xml version="1.0" encoding="utf-8"?>
+<p:sld xmlns:a="http://schemas.openxmlformats.org/drawingml/2006/main" xmlns:r="http://schemas.openxmlformats.org/officeDocument/2006/relationships" xmlns:p="http://schemas.openxmlformats.org/presentationml/2006/main">
+  <p:cSld>
+    <p:spTree>
+      <p:nvGrpSpPr>
+        <p:cNvPr id="1" name=""/>
+        <p:cNvGrpSpPr/>
+        <p:nvPr/>
+      </p:nvGrpSpPr>
+      <p:grpSpPr>
+        <a:xfrm>
+          <a:off x="0" y="0"/>
+          <a:ext cx="0" cy="0"/>
+          <a:chOff x="0" y="0"/>
+          <a:chExt cx="0" cy="0"/>
+        </a:xfrm>
+      </p:grpSpPr>
+      <p:sp>
+        <p:nvSpPr>
+          <p:cNvPr id="2" name="Slide Number Placeholder 1">
+            <a:extLst>
+              <a:ext uri="{FF2B5EF4-FFF2-40B4-BE49-F238E27FC236}">
                 <a16:creationId xmlns:a16="http://schemas.microsoft.com/office/drawing/2014/main" id="{B5303F92-888C-138C-9882-4B9C995E4A69}"/>
               </a:ext>
             </a:extLst>
@@ -15193,7 +15396,7 @@
             <a:fld id="{2BF067CD-8E6B-4360-9AA8-C5DF2A48A6D1}" type="slidenum">
               <a:rPr lang="en-US" noProof="0" smtClean="0"/>
               <a:pPr/>
-              <a:t>21</a:t>
+              <a:t>22</a:t>
             </a:fld>
             <a:endParaRPr lang="en-US" noProof="0" dirty="0"/>
           </a:p>
@@ -15425,7 +15628,7 @@
 </p:sld>
 </file>
 
-<file path=ppt/slides/slide22.xml><?xml version="1.0" encoding="utf-8"?>
+<file path=ppt/slides/slide23.xml><?xml version="1.0" encoding="utf-8"?>
 <p:sld xmlns:a="http://schemas.openxmlformats.org/drawingml/2006/main" xmlns:r="http://schemas.openxmlformats.org/officeDocument/2006/relationships" xmlns:p="http://schemas.openxmlformats.org/presentationml/2006/main">
   <p:cSld>
     <p:spTree>
@@ -15561,7 +15764,7 @@
 </p:sld>
 </file>
 
-<file path=ppt/slides/slide23.xml><?xml version="1.0" encoding="utf-8"?>
+<file path=ppt/slides/slide24.xml><?xml version="1.0" encoding="utf-8"?>
 <p:sld xmlns:a="http://schemas.openxmlformats.org/drawingml/2006/main" xmlns:r="http://schemas.openxmlformats.org/officeDocument/2006/relationships" xmlns:p="http://schemas.openxmlformats.org/presentationml/2006/main">
   <p:cSld>
     <p:spTree>
@@ -15602,7 +15805,7 @@
             <a:fld id="{2BF067CD-8E6B-4360-9AA8-C5DF2A48A6D1}" type="slidenum">
               <a:rPr lang="en-US" noProof="0" smtClean="0"/>
               <a:pPr/>
-              <a:t>23</a:t>
+              <a:t>24</a:t>
             </a:fld>
             <a:endParaRPr lang="en-US" noProof="0" dirty="0"/>
           </a:p>
@@ -16015,7 +16218,7 @@
 </p:sld>
 </file>
 
-<file path=ppt/slides/slide24.xml><?xml version="1.0" encoding="utf-8"?>
+<file path=ppt/slides/slide25.xml><?xml version="1.0" encoding="utf-8"?>
 <p:sld xmlns:a="http://schemas.openxmlformats.org/drawingml/2006/main" xmlns:r="http://schemas.openxmlformats.org/officeDocument/2006/relationships" xmlns:p="http://schemas.openxmlformats.org/presentationml/2006/main">
   <p:cSld>
     <p:spTree>
@@ -16056,7 +16259,7 @@
             <a:fld id="{2BF067CD-8E6B-4360-9AA8-C5DF2A48A6D1}" type="slidenum">
               <a:rPr lang="en-US" noProof="0" smtClean="0"/>
               <a:pPr/>
-              <a:t>24</a:t>
+              <a:t>25</a:t>
             </a:fld>
             <a:endParaRPr lang="en-US" noProof="0" dirty="0"/>
           </a:p>
@@ -16556,7 +16759,7 @@
 </p:sld>
 </file>
 
-<file path=ppt/slides/slide25.xml><?xml version="1.0" encoding="utf-8"?>
+<file path=ppt/slides/slide26.xml><?xml version="1.0" encoding="utf-8"?>
 <p:sld xmlns:a="http://schemas.openxmlformats.org/drawingml/2006/main" xmlns:r="http://schemas.openxmlformats.org/officeDocument/2006/relationships" xmlns:p="http://schemas.openxmlformats.org/presentationml/2006/main">
   <p:cSld>
     <p:spTree>
@@ -16597,7 +16800,7 @@
             <a:fld id="{2BF067CD-8E6B-4360-9AA8-C5DF2A48A6D1}" type="slidenum">
               <a:rPr lang="en-US" noProof="0" smtClean="0"/>
               <a:pPr/>
-              <a:t>25</a:t>
+              <a:t>26</a:t>
             </a:fld>
             <a:endParaRPr lang="en-US" noProof="0" dirty="0"/>
           </a:p>
@@ -17093,7 +17296,7 @@
 </p:sld>
 </file>
 
-<file path=ppt/slides/slide26.xml><?xml version="1.0" encoding="utf-8"?>
+<file path=ppt/slides/slide27.xml><?xml version="1.0" encoding="utf-8"?>
 <p:sld xmlns:a="http://schemas.openxmlformats.org/drawingml/2006/main" xmlns:r="http://schemas.openxmlformats.org/officeDocument/2006/relationships" xmlns:p="http://schemas.openxmlformats.org/presentationml/2006/main">
   <p:cSld>
     <p:spTree>
@@ -17134,7 +17337,7 @@
             <a:fld id="{2BF067CD-8E6B-4360-9AA8-C5DF2A48A6D1}" type="slidenum">
               <a:rPr lang="en-US" noProof="0" smtClean="0"/>
               <a:pPr/>
-              <a:t>26</a:t>
+              <a:t>27</a:t>
             </a:fld>
             <a:endParaRPr lang="en-US" noProof="0" dirty="0"/>
           </a:p>
@@ -17266,7 +17469,15 @@
             </a:r>
             <a:r>
               <a:rPr lang="bg-BG" sz="3000" dirty="0"/>
-              <a:t> домашната директория на потребителя</a:t>
+              <a:t> домашната (</a:t>
+            </a:r>
+            <a:r>
+              <a:rPr lang="en-GB" sz="3000" dirty="0"/>
+              <a:t>root</a:t>
+            </a:r>
+            <a:r>
+              <a:rPr lang="bg-BG" sz="3000" dirty="0"/>
+              <a:t>) директория на потребителя</a:t>
             </a:r>
             <a:endParaRPr lang="en-BG" sz="3000" dirty="0"/>
           </a:p>
@@ -17764,7 +17975,7 @@
 </p:sld>
 </file>
 
-<file path=ppt/slides/slide27.xml><?xml version="1.0" encoding="utf-8"?>
+<file path=ppt/slides/slide28.xml><?xml version="1.0" encoding="utf-8"?>
 <p:sld xmlns:a="http://schemas.openxmlformats.org/drawingml/2006/main" xmlns:r="http://schemas.openxmlformats.org/officeDocument/2006/relationships" xmlns:p="http://schemas.openxmlformats.org/presentationml/2006/main">
   <p:cSld>
     <p:spTree>
@@ -17895,7 +18106,7 @@
 </p:sld>
 </file>
 
-<file path=ppt/slides/slide28.xml><?xml version="1.0" encoding="utf-8"?>
+<file path=ppt/slides/slide29.xml><?xml version="1.0" encoding="utf-8"?>
 <p:sld xmlns:a="http://schemas.openxmlformats.org/drawingml/2006/main" xmlns:r="http://schemas.openxmlformats.org/officeDocument/2006/relationships" xmlns:p="http://schemas.openxmlformats.org/presentationml/2006/main">
   <p:cSld>
     <p:spTree>
@@ -17936,7 +18147,7 @@
             <a:fld id="{2BF067CD-8E6B-4360-9AA8-C5DF2A48A6D1}" type="slidenum">
               <a:rPr lang="en-US" noProof="0" smtClean="0"/>
               <a:pPr/>
-              <a:t>28</a:t>
+              <a:t>29</a:t>
             </a:fld>
             <a:endParaRPr lang="en-US" noProof="0" dirty="0"/>
           </a:p>
@@ -18195,7 +18406,138 @@
 </p:sld>
 </file>
 
-<file path=ppt/slides/slide29.xml><?xml version="1.0" encoding="utf-8"?>
+<file path=ppt/slides/slide3.xml><?xml version="1.0" encoding="utf-8"?>
+<p:sld xmlns:a="http://schemas.openxmlformats.org/drawingml/2006/main" xmlns:r="http://schemas.openxmlformats.org/officeDocument/2006/relationships" xmlns:p="http://schemas.openxmlformats.org/presentationml/2006/main">
+  <p:cSld>
+    <p:spTree>
+      <p:nvGrpSpPr>
+        <p:cNvPr id="1" name=""/>
+        <p:cNvGrpSpPr/>
+        <p:nvPr/>
+      </p:nvGrpSpPr>
+      <p:grpSpPr>
+        <a:xfrm>
+          <a:off x="0" y="0"/>
+          <a:ext cx="0" cy="0"/>
+          <a:chOff x="0" y="0"/>
+          <a:chExt cx="0" cy="0"/>
+        </a:xfrm>
+      </p:grpSpPr>
+      <p:sp>
+        <p:nvSpPr>
+          <p:cNvPr id="4" name="Slide Subtitle">
+            <a:extLst>
+              <a:ext uri="{FF2B5EF4-FFF2-40B4-BE49-F238E27FC236}">
+                <a16:creationId xmlns:a16="http://schemas.microsoft.com/office/drawing/2014/main" id="{BEB5BB41-09D4-4E9F-8C80-EE8709171CB3}"/>
+              </a:ext>
+            </a:extLst>
+          </p:cNvPr>
+          <p:cNvSpPr>
+            <a:spLocks noGrp="1"/>
+          </p:cNvSpPr>
+          <p:nvPr>
+            <p:ph type="subTitle" sz="quarter" idx="11"/>
+          </p:nvPr>
+        </p:nvSpPr>
+        <p:spPr/>
+        <p:txBody>
+          <a:bodyPr/>
+          <a:lstStyle/>
+          <a:p>
+            <a:r>
+              <a:rPr lang="bg-BG" dirty="0"/>
+              <a:t>Съвкупността от софтуер и хардуер</a:t>
+            </a:r>
+          </a:p>
+        </p:txBody>
+      </p:sp>
+      <p:sp>
+        <p:nvSpPr>
+          <p:cNvPr id="6" name="Slide Title">
+            <a:extLst>
+              <a:ext uri="{FF2B5EF4-FFF2-40B4-BE49-F238E27FC236}">
+                <a16:creationId xmlns:a16="http://schemas.microsoft.com/office/drawing/2014/main" id="{028D9EA3-B5E0-4F17-9467-4BE3C280DA68}"/>
+              </a:ext>
+            </a:extLst>
+          </p:cNvPr>
+          <p:cNvSpPr>
+            <a:spLocks noGrp="1"/>
+          </p:cNvSpPr>
+          <p:nvPr>
+            <p:ph type="title" sz="quarter" idx="10"/>
+          </p:nvPr>
+        </p:nvSpPr>
+        <p:spPr/>
+        <p:txBody>
+          <a:bodyPr/>
+          <a:lstStyle/>
+          <a:p>
+            <a:r>
+              <a:rPr lang="bg-BG" dirty="0"/>
+              <a:t>Компютърни системи</a:t>
+            </a:r>
+            <a:endParaRPr lang="en-US" dirty="0"/>
+          </a:p>
+        </p:txBody>
+      </p:sp>
+      <p:pic>
+        <p:nvPicPr>
+          <p:cNvPr id="3" name="Picture 2">
+            <a:extLst>
+              <a:ext uri="{FF2B5EF4-FFF2-40B4-BE49-F238E27FC236}">
+                <a16:creationId xmlns:a16="http://schemas.microsoft.com/office/drawing/2014/main" id="{210DCB37-7333-7A26-54A2-B4A9B9887852}"/>
+              </a:ext>
+            </a:extLst>
+          </p:cNvPr>
+          <p:cNvPicPr>
+            <a:picLocks noChangeAspect="1"/>
+          </p:cNvPicPr>
+          <p:nvPr/>
+        </p:nvPicPr>
+        <p:blipFill>
+          <a:blip r:embed="rId3">
+            <a:extLst>
+              <a:ext uri="{28A0092B-C50C-407E-A947-70E740481C1C}">
+                <a14:useLocalDpi xmlns:a14="http://schemas.microsoft.com/office/drawing/2010/main" val="0"/>
+              </a:ext>
+            </a:extLst>
+          </a:blip>
+          <a:stretch>
+            <a:fillRect/>
+          </a:stretch>
+        </p:blipFill>
+        <p:spPr>
+          <a:xfrm>
+            <a:off x="4667250" y="1385091"/>
+            <a:ext cx="2857500" cy="2303859"/>
+          </a:xfrm>
+          <a:prstGeom prst="rect">
+            <a:avLst/>
+          </a:prstGeom>
+        </p:spPr>
+      </p:pic>
+    </p:spTree>
+    <p:extLst>
+      <p:ext uri="{BB962C8B-B14F-4D97-AF65-F5344CB8AC3E}">
+        <p14:creationId xmlns:p14="http://schemas.microsoft.com/office/powerpoint/2010/main" val="882194472"/>
+      </p:ext>
+    </p:extLst>
+  </p:cSld>
+  <p:clrMapOvr>
+    <a:masterClrMapping/>
+  </p:clrMapOvr>
+  <mc:AlternateContent xmlns:mc="http://schemas.openxmlformats.org/markup-compatibility/2006" xmlns:p14="http://schemas.microsoft.com/office/powerpoint/2010/main">
+    <mc:Choice Requires="p14">
+      <p:transition spd="slow" p14:dur="2000" advClick="0" advTm="5000"/>
+    </mc:Choice>
+    <mc:Fallback xmlns="">
+      <p:transition spd="slow" advClick="0" advTm="5000"/>
+    </mc:Fallback>
+  </mc:AlternateContent>
+</p:sld>
+</file>
+
+<file path=ppt/slides/slide30.xml><?xml version="1.0" encoding="utf-8"?>
 <p:sld xmlns:a="http://schemas.openxmlformats.org/drawingml/2006/main" xmlns:r="http://schemas.openxmlformats.org/officeDocument/2006/relationships" xmlns:p="http://schemas.openxmlformats.org/presentationml/2006/main">
   <p:cSld>
     <p:spTree>
@@ -18236,7 +18578,7 @@
             <a:fld id="{2BF067CD-8E6B-4360-9AA8-C5DF2A48A6D1}" type="slidenum">
               <a:rPr lang="en-US" noProof="0" smtClean="0"/>
               <a:pPr/>
-              <a:t>29</a:t>
+              <a:t>30</a:t>
             </a:fld>
             <a:endParaRPr lang="en-US" noProof="0" dirty="0"/>
           </a:p>
@@ -18861,138 +19203,7 @@
 </p:sld>
 </file>
 
-<file path=ppt/slides/slide3.xml><?xml version="1.0" encoding="utf-8"?>
-<p:sld xmlns:a="http://schemas.openxmlformats.org/drawingml/2006/main" xmlns:r="http://schemas.openxmlformats.org/officeDocument/2006/relationships" xmlns:p="http://schemas.openxmlformats.org/presentationml/2006/main">
-  <p:cSld>
-    <p:spTree>
-      <p:nvGrpSpPr>
-        <p:cNvPr id="1" name=""/>
-        <p:cNvGrpSpPr/>
-        <p:nvPr/>
-      </p:nvGrpSpPr>
-      <p:grpSpPr>
-        <a:xfrm>
-          <a:off x="0" y="0"/>
-          <a:ext cx="0" cy="0"/>
-          <a:chOff x="0" y="0"/>
-          <a:chExt cx="0" cy="0"/>
-        </a:xfrm>
-      </p:grpSpPr>
-      <p:sp>
-        <p:nvSpPr>
-          <p:cNvPr id="4" name="Slide Subtitle">
-            <a:extLst>
-              <a:ext uri="{FF2B5EF4-FFF2-40B4-BE49-F238E27FC236}">
-                <a16:creationId xmlns:a16="http://schemas.microsoft.com/office/drawing/2014/main" id="{BEB5BB41-09D4-4E9F-8C80-EE8709171CB3}"/>
-              </a:ext>
-            </a:extLst>
-          </p:cNvPr>
-          <p:cNvSpPr>
-            <a:spLocks noGrp="1"/>
-          </p:cNvSpPr>
-          <p:nvPr>
-            <p:ph type="subTitle" sz="quarter" idx="11"/>
-          </p:nvPr>
-        </p:nvSpPr>
-        <p:spPr/>
-        <p:txBody>
-          <a:bodyPr/>
-          <a:lstStyle/>
-          <a:p>
-            <a:r>
-              <a:rPr lang="bg-BG" dirty="0"/>
-              <a:t>Съвкупността от софтуер и хардуер</a:t>
-            </a:r>
-          </a:p>
-        </p:txBody>
-      </p:sp>
-      <p:sp>
-        <p:nvSpPr>
-          <p:cNvPr id="6" name="Slide Title">
-            <a:extLst>
-              <a:ext uri="{FF2B5EF4-FFF2-40B4-BE49-F238E27FC236}">
-                <a16:creationId xmlns:a16="http://schemas.microsoft.com/office/drawing/2014/main" id="{028D9EA3-B5E0-4F17-9467-4BE3C280DA68}"/>
-              </a:ext>
-            </a:extLst>
-          </p:cNvPr>
-          <p:cNvSpPr>
-            <a:spLocks noGrp="1"/>
-          </p:cNvSpPr>
-          <p:nvPr>
-            <p:ph type="title" sz="quarter" idx="10"/>
-          </p:nvPr>
-        </p:nvSpPr>
-        <p:spPr/>
-        <p:txBody>
-          <a:bodyPr/>
-          <a:lstStyle/>
-          <a:p>
-            <a:r>
-              <a:rPr lang="bg-BG" dirty="0"/>
-              <a:t>Компютърни системи</a:t>
-            </a:r>
-            <a:endParaRPr lang="en-US" dirty="0"/>
-          </a:p>
-        </p:txBody>
-      </p:sp>
-      <p:pic>
-        <p:nvPicPr>
-          <p:cNvPr id="3" name="Picture 2">
-            <a:extLst>
-              <a:ext uri="{FF2B5EF4-FFF2-40B4-BE49-F238E27FC236}">
-                <a16:creationId xmlns:a16="http://schemas.microsoft.com/office/drawing/2014/main" id="{210DCB37-7333-7A26-54A2-B4A9B9887852}"/>
-              </a:ext>
-            </a:extLst>
-          </p:cNvPr>
-          <p:cNvPicPr>
-            <a:picLocks noChangeAspect="1"/>
-          </p:cNvPicPr>
-          <p:nvPr/>
-        </p:nvPicPr>
-        <p:blipFill>
-          <a:blip r:embed="rId3">
-            <a:extLst>
-              <a:ext uri="{28A0092B-C50C-407E-A947-70E740481C1C}">
-                <a14:useLocalDpi xmlns:a14="http://schemas.microsoft.com/office/drawing/2010/main" val="0"/>
-              </a:ext>
-            </a:extLst>
-          </a:blip>
-          <a:stretch>
-            <a:fillRect/>
-          </a:stretch>
-        </p:blipFill>
-        <p:spPr>
-          <a:xfrm>
-            <a:off x="4667250" y="1385091"/>
-            <a:ext cx="2857500" cy="2303859"/>
-          </a:xfrm>
-          <a:prstGeom prst="rect">
-            <a:avLst/>
-          </a:prstGeom>
-        </p:spPr>
-      </p:pic>
-    </p:spTree>
-    <p:extLst>
-      <p:ext uri="{BB962C8B-B14F-4D97-AF65-F5344CB8AC3E}">
-        <p14:creationId xmlns:p14="http://schemas.microsoft.com/office/powerpoint/2010/main" val="882194472"/>
-      </p:ext>
-    </p:extLst>
-  </p:cSld>
-  <p:clrMapOvr>
-    <a:masterClrMapping/>
-  </p:clrMapOvr>
-  <mc:AlternateContent xmlns:mc="http://schemas.openxmlformats.org/markup-compatibility/2006" xmlns:p14="http://schemas.microsoft.com/office/powerpoint/2010/main">
-    <mc:Choice Requires="p14">
-      <p:transition spd="slow" p14:dur="2000" advClick="0" advTm="5000"/>
-    </mc:Choice>
-    <mc:Fallback xmlns="">
-      <p:transition spd="slow" advClick="0" advTm="5000"/>
-    </mc:Fallback>
-  </mc:AlternateContent>
-</p:sld>
-</file>
-
-<file path=ppt/slides/slide30.xml><?xml version="1.0" encoding="utf-8"?>
+<file path=ppt/slides/slide31.xml><?xml version="1.0" encoding="utf-8"?>
 <p:sld xmlns:a="http://schemas.openxmlformats.org/drawingml/2006/main" xmlns:r="http://schemas.openxmlformats.org/officeDocument/2006/relationships" xmlns:p="http://schemas.openxmlformats.org/presentationml/2006/main">
   <p:cSld>
     <p:spTree>
@@ -19033,7 +19244,7 @@
             <a:fld id="{2BF067CD-8E6B-4360-9AA8-C5DF2A48A6D1}" type="slidenum">
               <a:rPr lang="en-US" noProof="0" smtClean="0"/>
               <a:pPr/>
-              <a:t>30</a:t>
+              <a:t>31</a:t>
             </a:fld>
             <a:endParaRPr lang="en-US" noProof="0" dirty="0"/>
           </a:p>
@@ -19308,7 +19519,7 @@
 </p:sld>
 </file>
 
-<file path=ppt/slides/slide31.xml><?xml version="1.0" encoding="utf-8"?>
+<file path=ppt/slides/slide32.xml><?xml version="1.0" encoding="utf-8"?>
 <p:sld xmlns:a="http://schemas.openxmlformats.org/drawingml/2006/main" xmlns:r="http://schemas.openxmlformats.org/officeDocument/2006/relationships" xmlns:p="http://schemas.openxmlformats.org/presentationml/2006/main">
   <p:cSld>
     <p:spTree>
@@ -19349,7 +19560,7 @@
             <a:fld id="{2BF067CD-8E6B-4360-9AA8-C5DF2A48A6D1}" type="slidenum">
               <a:rPr lang="en-US" noProof="0" smtClean="0"/>
               <a:pPr/>
-              <a:t>31</a:t>
+              <a:t>32</a:t>
             </a:fld>
             <a:endParaRPr lang="en-US" noProof="0" dirty="0"/>
           </a:p>
@@ -19499,7 +19710,7 @@
           <p:nvPr/>
         </p:nvPicPr>
         <p:blipFill>
-          <a:blip r:embed="rId2">
+          <a:blip r:embed="rId3">
             <a:extLst>
               <a:ext uri="{28A0092B-C50C-407E-A947-70E740481C1C}">
                 <a14:useLocalDpi xmlns:a14="http://schemas.microsoft.com/office/drawing/2010/main" val="0"/>
@@ -19813,10 +20024,15 @@
       </p:par>
     </p:tnLst>
   </p:timing>
+  <p:extLst>
+    <p:ext uri="{6950BFC3-D8DA-4A85-94F7-54DA5524770B}">
+      <p188:commentRel xmlns:p188="http://schemas.microsoft.com/office/powerpoint/2018/8/main" r:id="rId2"/>
+    </p:ext>
+  </p:extLst>
 </p:sld>
 </file>
 
-<file path=ppt/slides/slide32.xml><?xml version="1.0" encoding="utf-8"?>
+<file path=ppt/slides/slide33.xml><?xml version="1.0" encoding="utf-8"?>
 <p:sld xmlns:a="http://schemas.openxmlformats.org/drawingml/2006/main" xmlns:r="http://schemas.openxmlformats.org/officeDocument/2006/relationships" xmlns:p="http://schemas.openxmlformats.org/presentationml/2006/main">
   <p:cSld>
     <p:spTree>
@@ -19952,7 +20168,7 @@
 </p:sld>
 </file>
 
-<file path=ppt/slides/slide33.xml><?xml version="1.0" encoding="utf-8"?>
+<file path=ppt/slides/slide34.xml><?xml version="1.0" encoding="utf-8"?>
 <p:sld xmlns:a="http://schemas.openxmlformats.org/drawingml/2006/main" xmlns:r="http://schemas.openxmlformats.org/officeDocument/2006/relationships" xmlns:p="http://schemas.openxmlformats.org/presentationml/2006/main">
   <p:cSld>
     <p:spTree>
@@ -19993,7 +20209,7 @@
             <a:fld id="{2BF067CD-8E6B-4360-9AA8-C5DF2A48A6D1}" type="slidenum">
               <a:rPr lang="en-US" noProof="0" smtClean="0"/>
               <a:pPr/>
-              <a:t>33</a:t>
+              <a:t>34</a:t>
             </a:fld>
             <a:endParaRPr lang="en-US" noProof="0" dirty="0"/>
           </a:p>
@@ -20987,7 +21203,7 @@
 </p:sld>
 </file>
 
-<file path=ppt/slides/slide34.xml><?xml version="1.0" encoding="utf-8"?>
+<file path=ppt/slides/slide35.xml><?xml version="1.0" encoding="utf-8"?>
 <p:sld xmlns:a="http://schemas.openxmlformats.org/drawingml/2006/main" xmlns:r="http://schemas.openxmlformats.org/officeDocument/2006/relationships" xmlns:p="http://schemas.openxmlformats.org/presentationml/2006/main">
   <p:cSld>
     <p:spTree>
@@ -21028,7 +21244,7 @@
             <a:fld id="{2BF067CD-8E6B-4360-9AA8-C5DF2A48A6D1}" type="slidenum">
               <a:rPr lang="en-US" noProof="0" smtClean="0"/>
               <a:pPr/>
-              <a:t>34</a:t>
+              <a:t>35</a:t>
             </a:fld>
             <a:endParaRPr lang="en-US" noProof="0" dirty="0"/>
           </a:p>
@@ -21430,7 +21646,7 @@
 </p:sld>
 </file>
 
-<file path=ppt/slides/slide35.xml><?xml version="1.0" encoding="utf-8"?>
+<file path=ppt/slides/slide36.xml><?xml version="1.0" encoding="utf-8"?>
 <p:sld xmlns:a="http://schemas.openxmlformats.org/drawingml/2006/main" xmlns:r="http://schemas.openxmlformats.org/officeDocument/2006/relationships" xmlns:p="http://schemas.openxmlformats.org/presentationml/2006/main">
   <p:cSld>
     <p:spTree>
@@ -22091,7 +22307,7 @@
             <a:fld id="{2BF067CD-8E6B-4360-9AA8-C5DF2A48A6D1}" type="slidenum">
               <a:rPr lang="en-US" noProof="0" smtClean="0"/>
               <a:pPr/>
-              <a:t>35</a:t>
+              <a:t>36</a:t>
             </a:fld>
             <a:endParaRPr lang="en-US" noProof="0" dirty="0"/>
           </a:p>
@@ -22442,7 +22658,7 @@
 </p:sld>
 </file>
 
-<file path=ppt/slides/slide36.xml><?xml version="1.0" encoding="utf-8"?>
+<file path=ppt/slides/slide37.xml><?xml version="1.0" encoding="utf-8"?>
 <p:sld xmlns:a="http://schemas.openxmlformats.org/drawingml/2006/main" xmlns:r="http://schemas.openxmlformats.org/officeDocument/2006/relationships" xmlns:p="http://schemas.openxmlformats.org/presentationml/2006/main">
   <p:cSld>
     <p:spTree>
@@ -22632,7 +22848,7 @@
 </p:sld>
 </file>
 
-<file path=ppt/slides/slide37.xml><?xml version="1.0" encoding="utf-8"?>
+<file path=ppt/slides/slide38.xml><?xml version="1.0" encoding="utf-8"?>
 <p:sld xmlns:a="http://schemas.openxmlformats.org/drawingml/2006/main" xmlns:r="http://schemas.openxmlformats.org/officeDocument/2006/relationships" xmlns:p="http://schemas.openxmlformats.org/presentationml/2006/main" show="0">
   <p:cSld>
     <p:spTree>
@@ -22685,7 +22901,7 @@
             <a:fld id="{2BF067CD-8E6B-4360-9AA8-C5DF2A48A6D1}" type="slidenum">
               <a:rPr lang="en-US" smtClean="0"/>
               <a:pPr/>
-              <a:t>37</a:t>
+              <a:t>38</a:t>
             </a:fld>
             <a:endParaRPr lang="en-US" dirty="0"/>
           </a:p>

</xml_diff>